<commit_message>
idk lol here's a descrpition'
</commit_message>
<xml_diff>
--- a/plots/Collected plots.pptx
+++ b/plots/Collected plots.pptx
@@ -3356,8 +3356,8 @@
         </p:nvSpPr>
         <p:spPr>
           <a:xfrm>
-            <a:off x="3121891" y="0"/>
-            <a:ext cx="5514109" cy="646331"/>
+            <a:off x="1951892" y="0"/>
+            <a:ext cx="7192107" cy="646331"/>
           </a:xfrm>
           <a:prstGeom prst="rect">
             <a:avLst/>
@@ -3372,7 +3372,7 @@
           <a:p>
             <a:r>
               <a:rPr lang="en-GB" dirty="0"/>
-              <a:t>Electron density at nu=1/2 on a sphere calculated with Monte Carlo</a:t>
+              <a:t>Electron density at nu=1/2 on a sphere calculated with Monte Carlo Monte Carlo</a:t>
             </a:r>
           </a:p>
         </p:txBody>
@@ -3426,7 +3426,7 @@
         </p:nvSpPr>
         <p:spPr>
           <a:xfrm>
-            <a:off x="203200" y="6289964"/>
+            <a:off x="203200" y="6165503"/>
             <a:ext cx="11674764" cy="369332"/>
           </a:xfrm>
           <a:prstGeom prst="rect">
@@ -3443,6 +3443,327 @@
             <a:r>
               <a:rPr lang="en-GB" dirty="0"/>
               <a:t>Aim of these plots: work out if I’ve correctly implemented the wavefunction. Are these results reasonable/correct?</a:t>
+            </a:r>
+          </a:p>
+        </p:txBody>
+      </p:sp>
+      <p:pic>
+        <p:nvPicPr>
+          <p:cNvPr id="3" name="Picture 2">
+            <a:extLst>
+              <a:ext uri="{FF2B5EF4-FFF2-40B4-BE49-F238E27FC236}">
+                <a16:creationId xmlns:a16="http://schemas.microsoft.com/office/drawing/2014/main" id="{D88A91C3-EEA1-69DC-F56E-CDEA5CE07F67}"/>
+              </a:ext>
+            </a:extLst>
+          </p:cNvPr>
+          <p:cNvPicPr>
+            <a:picLocks noChangeAspect="1"/>
+          </p:cNvPicPr>
+          <p:nvPr/>
+        </p:nvPicPr>
+        <p:blipFill>
+          <a:blip r:embed="rId2">
+            <a:extLst>
+              <a:ext uri="{28A0092B-C50C-407E-A947-70E740481C1C}">
+                <a14:useLocalDpi xmlns:a14="http://schemas.microsoft.com/office/drawing/2010/main" val="0"/>
+              </a:ext>
+            </a:extLst>
+          </a:blip>
+          <a:stretch>
+            <a:fillRect/>
+          </a:stretch>
+        </p:blipFill>
+        <p:spPr>
+          <a:xfrm>
+            <a:off x="174404" y="323164"/>
+            <a:ext cx="3996634" cy="2967501"/>
+          </a:xfrm>
+          <a:prstGeom prst="rect">
+            <a:avLst/>
+          </a:prstGeom>
+        </p:spPr>
+      </p:pic>
+      <p:pic>
+        <p:nvPicPr>
+          <p:cNvPr id="5" name="Picture 4">
+            <a:extLst>
+              <a:ext uri="{FF2B5EF4-FFF2-40B4-BE49-F238E27FC236}">
+                <a16:creationId xmlns:a16="http://schemas.microsoft.com/office/drawing/2014/main" id="{6B42E1AB-9F7C-961C-AA62-53849AD085A9}"/>
+              </a:ext>
+            </a:extLst>
+          </p:cNvPr>
+          <p:cNvPicPr>
+            <a:picLocks noChangeAspect="1"/>
+          </p:cNvPicPr>
+          <p:nvPr/>
+        </p:nvPicPr>
+        <p:blipFill>
+          <a:blip r:embed="rId3">
+            <a:extLst>
+              <a:ext uri="{28A0092B-C50C-407E-A947-70E740481C1C}">
+                <a14:useLocalDpi xmlns:a14="http://schemas.microsoft.com/office/drawing/2010/main" val="0"/>
+              </a:ext>
+            </a:extLst>
+          </a:blip>
+          <a:stretch>
+            <a:fillRect/>
+          </a:stretch>
+        </p:blipFill>
+        <p:spPr>
+          <a:xfrm>
+            <a:off x="4097960" y="339781"/>
+            <a:ext cx="3931689" cy="2967501"/>
+          </a:xfrm>
+          <a:prstGeom prst="rect">
+            <a:avLst/>
+          </a:prstGeom>
+        </p:spPr>
+      </p:pic>
+      <p:pic>
+        <p:nvPicPr>
+          <p:cNvPr id="7" name="Picture 6">
+            <a:extLst>
+              <a:ext uri="{FF2B5EF4-FFF2-40B4-BE49-F238E27FC236}">
+                <a16:creationId xmlns:a16="http://schemas.microsoft.com/office/drawing/2014/main" id="{24CDE162-4B99-EA94-00C5-7C9F2F4CA4B1}"/>
+              </a:ext>
+            </a:extLst>
+          </p:cNvPr>
+          <p:cNvPicPr>
+            <a:picLocks noChangeAspect="1"/>
+          </p:cNvPicPr>
+          <p:nvPr/>
+        </p:nvPicPr>
+        <p:blipFill>
+          <a:blip r:embed="rId4">
+            <a:extLst>
+              <a:ext uri="{28A0092B-C50C-407E-A947-70E740481C1C}">
+                <a14:useLocalDpi xmlns:a14="http://schemas.microsoft.com/office/drawing/2010/main" val="0"/>
+              </a:ext>
+            </a:extLst>
+          </a:blip>
+          <a:stretch>
+            <a:fillRect/>
+          </a:stretch>
+        </p:blipFill>
+        <p:spPr>
+          <a:xfrm>
+            <a:off x="7881330" y="323165"/>
+            <a:ext cx="3996634" cy="2967501"/>
+          </a:xfrm>
+          <a:prstGeom prst="rect">
+            <a:avLst/>
+          </a:prstGeom>
+        </p:spPr>
+      </p:pic>
+      <p:pic>
+        <p:nvPicPr>
+          <p:cNvPr id="9" name="Picture 8">
+            <a:extLst>
+              <a:ext uri="{FF2B5EF4-FFF2-40B4-BE49-F238E27FC236}">
+                <a16:creationId xmlns:a16="http://schemas.microsoft.com/office/drawing/2014/main" id="{59257A4D-F689-27FC-4739-AF318CF72811}"/>
+              </a:ext>
+            </a:extLst>
+          </p:cNvPr>
+          <p:cNvPicPr>
+            <a:picLocks noChangeAspect="1"/>
+          </p:cNvPicPr>
+          <p:nvPr/>
+        </p:nvPicPr>
+        <p:blipFill>
+          <a:blip r:embed="rId5">
+            <a:extLst>
+              <a:ext uri="{28A0092B-C50C-407E-A947-70E740481C1C}">
+                <a14:useLocalDpi xmlns:a14="http://schemas.microsoft.com/office/drawing/2010/main" val="0"/>
+              </a:ext>
+            </a:extLst>
+          </a:blip>
+          <a:stretch>
+            <a:fillRect/>
+          </a:stretch>
+        </p:blipFill>
+        <p:spPr>
+          <a:xfrm>
+            <a:off x="0" y="3076473"/>
+            <a:ext cx="4126525" cy="2967501"/>
+          </a:xfrm>
+          <a:prstGeom prst="rect">
+            <a:avLst/>
+          </a:prstGeom>
+        </p:spPr>
+      </p:pic>
+      <p:pic>
+        <p:nvPicPr>
+          <p:cNvPr id="14" name="Picture 13">
+            <a:extLst>
+              <a:ext uri="{FF2B5EF4-FFF2-40B4-BE49-F238E27FC236}">
+                <a16:creationId xmlns:a16="http://schemas.microsoft.com/office/drawing/2014/main" id="{2BC41DCA-23E8-627B-A223-84C13EA442C8}"/>
+              </a:ext>
+            </a:extLst>
+          </p:cNvPr>
+          <p:cNvPicPr>
+            <a:picLocks noChangeAspect="1"/>
+          </p:cNvPicPr>
+          <p:nvPr/>
+        </p:nvPicPr>
+        <p:blipFill>
+          <a:blip r:embed="rId6">
+            <a:extLst>
+              <a:ext uri="{28A0092B-C50C-407E-A947-70E740481C1C}">
+                <a14:useLocalDpi xmlns:a14="http://schemas.microsoft.com/office/drawing/2010/main" val="0"/>
+              </a:ext>
+            </a:extLst>
+          </a:blip>
+          <a:stretch>
+            <a:fillRect/>
+          </a:stretch>
+        </p:blipFill>
+        <p:spPr>
+          <a:xfrm>
+            <a:off x="4104712" y="3076472"/>
+            <a:ext cx="3871739" cy="2967501"/>
+          </a:xfrm>
+          <a:prstGeom prst="rect">
+            <a:avLst/>
+          </a:prstGeom>
+        </p:spPr>
+      </p:pic>
+      <p:pic>
+        <p:nvPicPr>
+          <p:cNvPr id="16" name="Picture 15">
+            <a:extLst>
+              <a:ext uri="{FF2B5EF4-FFF2-40B4-BE49-F238E27FC236}">
+                <a16:creationId xmlns:a16="http://schemas.microsoft.com/office/drawing/2014/main" id="{0C8304EE-7133-74FC-7A7A-6B606DCA3C5A}"/>
+              </a:ext>
+            </a:extLst>
+          </p:cNvPr>
+          <p:cNvPicPr>
+            <a:picLocks noChangeAspect="1"/>
+          </p:cNvPicPr>
+          <p:nvPr/>
+        </p:nvPicPr>
+        <p:blipFill>
+          <a:blip r:embed="rId7">
+            <a:extLst>
+              <a:ext uri="{28A0092B-C50C-407E-A947-70E740481C1C}">
+                <a14:useLocalDpi xmlns:a14="http://schemas.microsoft.com/office/drawing/2010/main" val="0"/>
+              </a:ext>
+            </a:extLst>
+          </a:blip>
+          <a:stretch>
+            <a:fillRect/>
+          </a:stretch>
+        </p:blipFill>
+        <p:spPr>
+          <a:xfrm>
+            <a:off x="8006224" y="3076473"/>
+            <a:ext cx="3871740" cy="3072413"/>
+          </a:xfrm>
+          <a:prstGeom prst="rect">
+            <a:avLst/>
+          </a:prstGeom>
+        </p:spPr>
+      </p:pic>
+      <p:sp>
+        <p:nvSpPr>
+          <p:cNvPr id="17" name="TextBox 16">
+            <a:extLst>
+              <a:ext uri="{FF2B5EF4-FFF2-40B4-BE49-F238E27FC236}">
+                <a16:creationId xmlns:a16="http://schemas.microsoft.com/office/drawing/2014/main" id="{47BE06AB-7062-D3DE-59FA-9746D74DDE8A}"/>
+              </a:ext>
+            </a:extLst>
+          </p:cNvPr>
+          <p:cNvSpPr txBox="1"/>
+          <p:nvPr/>
+        </p:nvSpPr>
+        <p:spPr>
+          <a:xfrm>
+            <a:off x="174403" y="6646985"/>
+            <a:ext cx="3738173" cy="230832"/>
+          </a:xfrm>
+          <a:prstGeom prst="rect">
+            <a:avLst/>
+          </a:prstGeom>
+          <a:noFill/>
+        </p:spPr>
+        <p:txBody>
+          <a:bodyPr wrap="square" rtlCol="0">
+            <a:spAutoFit/>
+          </a:bodyPr>
+          <a:lstStyle/>
+          <a:p>
+            <a:r>
+              <a:rPr lang="en-GB" sz="900" dirty="0"/>
+              <a:t>Note 1: Hund’s rules are used for the partially filled LLs</a:t>
+            </a:r>
+          </a:p>
+        </p:txBody>
+      </p:sp>
+      <p:sp>
+        <p:nvSpPr>
+          <p:cNvPr id="18" name="TextBox 17">
+            <a:extLst>
+              <a:ext uri="{FF2B5EF4-FFF2-40B4-BE49-F238E27FC236}">
+                <a16:creationId xmlns:a16="http://schemas.microsoft.com/office/drawing/2014/main" id="{22724E57-DE9F-E23B-87FF-B097938B8FC8}"/>
+              </a:ext>
+            </a:extLst>
+          </p:cNvPr>
+          <p:cNvSpPr txBox="1"/>
+          <p:nvPr/>
+        </p:nvSpPr>
+        <p:spPr>
+          <a:xfrm>
+            <a:off x="3052418" y="6627168"/>
+            <a:ext cx="3738173" cy="230832"/>
+          </a:xfrm>
+          <a:prstGeom prst="rect">
+            <a:avLst/>
+          </a:prstGeom>
+          <a:noFill/>
+        </p:spPr>
+        <p:txBody>
+          <a:bodyPr wrap="square" rtlCol="0">
+            <a:spAutoFit/>
+          </a:bodyPr>
+          <a:lstStyle/>
+          <a:p>
+            <a:r>
+              <a:rPr lang="en-GB" sz="900" dirty="0"/>
+              <a:t>Note 2: The normalisations don’t seem correct</a:t>
+            </a:r>
+          </a:p>
+        </p:txBody>
+      </p:sp>
+      <p:sp>
+        <p:nvSpPr>
+          <p:cNvPr id="19" name="TextBox 18">
+            <a:extLst>
+              <a:ext uri="{FF2B5EF4-FFF2-40B4-BE49-F238E27FC236}">
+                <a16:creationId xmlns:a16="http://schemas.microsoft.com/office/drawing/2014/main" id="{B54C91A1-7377-1AE3-7874-D026558940EF}"/>
+              </a:ext>
+            </a:extLst>
+          </p:cNvPr>
+          <p:cNvSpPr txBox="1"/>
+          <p:nvPr/>
+        </p:nvSpPr>
+        <p:spPr>
+          <a:xfrm>
+            <a:off x="7209692" y="6508485"/>
+            <a:ext cx="3738173" cy="369332"/>
+          </a:xfrm>
+          <a:prstGeom prst="rect">
+            <a:avLst/>
+          </a:prstGeom>
+          <a:noFill/>
+        </p:spPr>
+        <p:txBody>
+          <a:bodyPr wrap="square" rtlCol="0">
+            <a:spAutoFit/>
+          </a:bodyPr>
+          <a:lstStyle/>
+          <a:p>
+            <a:r>
+              <a:rPr lang="en-GB" sz="900" dirty="0"/>
+              <a:t>Note 3: As expected, N=2 and N=6 (fully filled LLs) are uniform, and as N increases between LLs, the north pole is more dense (Hund’s rules)</a:t>
             </a:r>
           </a:p>
         </p:txBody>

</xml_diff>